<commit_message>
Added convolutions example, added readme, and updated PPT
</commit_message>
<xml_diff>
--- a/Machine Learning.pptx
+++ b/Machine Learning.pptx
@@ -1,6 +1,6 @@
 
 <file path=ppt/presentation.xml><?xml version="1.0" encoding="utf-8"?>
-<p:presentation xmlns:a="http://schemas.openxmlformats.org/drawingml/2006/main" xmlns:r="http://schemas.openxmlformats.org/officeDocument/2006/relationships" xmlns:p="http://schemas.openxmlformats.org/presentationml/2006/main" autoCompressPictures="0">
+<p:presentation xmlns:a="http://schemas.openxmlformats.org/drawingml/2006/main" xmlns:r="http://schemas.openxmlformats.org/officeDocument/2006/relationships" xmlns:p="http://schemas.openxmlformats.org/presentationml/2006/main" saveSubsetFonts="1" autoCompressPictures="0">
   <p:sldMasterIdLst>
     <p:sldMasterId id="2147483715" r:id="rId1"/>
   </p:sldMasterIdLst>
@@ -346,7 +346,7 @@
             <a:fld id="{B61BEF0D-F0BB-DE4B-95CE-6DB70DBA9567}" type="datetimeFigureOut">
               <a:rPr lang="en-US" smtClean="0"/>
               <a:pPr/>
-              <a:t>9/5/2017</a:t>
+              <a:t>9/26/17</a:t>
             </a:fld>
             <a:endParaRPr lang="en-US" dirty="0"/>
           </a:p>
@@ -556,7 +556,7 @@
             <a:fld id="{B61BEF0D-F0BB-DE4B-95CE-6DB70DBA9567}" type="datetimeFigureOut">
               <a:rPr lang="en-US" smtClean="0"/>
               <a:pPr/>
-              <a:t>9/5/2017</a:t>
+              <a:t>9/26/17</a:t>
             </a:fld>
             <a:endParaRPr lang="en-US" dirty="0"/>
           </a:p>
@@ -814,7 +814,7 @@
             <a:fld id="{B61BEF0D-F0BB-DE4B-95CE-6DB70DBA9567}" type="datetimeFigureOut">
               <a:rPr lang="en-US" smtClean="0"/>
               <a:pPr/>
-              <a:t>9/5/2017</a:t>
+              <a:t>9/26/17</a:t>
             </a:fld>
             <a:endParaRPr lang="en-US" dirty="0"/>
           </a:p>
@@ -990,7 +990,7 @@
             <a:fld id="{B61BEF0D-F0BB-DE4B-95CE-6DB70DBA9567}" type="datetimeFigureOut">
               <a:rPr lang="en-US" smtClean="0"/>
               <a:pPr/>
-              <a:t>9/5/2017</a:t>
+              <a:t>9/26/17</a:t>
             </a:fld>
             <a:endParaRPr lang="en-US" dirty="0"/>
           </a:p>
@@ -1327,7 +1327,7 @@
             <a:fld id="{B61BEF0D-F0BB-DE4B-95CE-6DB70DBA9567}" type="datetimeFigureOut">
               <a:rPr lang="en-US" smtClean="0"/>
               <a:pPr/>
-              <a:t>9/5/2017</a:t>
+              <a:t>9/26/17</a:t>
             </a:fld>
             <a:endParaRPr lang="en-US" dirty="0"/>
           </a:p>
@@ -1604,7 +1604,7 @@
             <a:fld id="{B61BEF0D-F0BB-DE4B-95CE-6DB70DBA9567}" type="datetimeFigureOut">
               <a:rPr lang="en-US" smtClean="0"/>
               <a:pPr/>
-              <a:t>9/5/2017</a:t>
+              <a:t>9/26/17</a:t>
             </a:fld>
             <a:endParaRPr lang="en-US" dirty="0"/>
           </a:p>
@@ -1985,7 +1985,7 @@
             <a:fld id="{B61BEF0D-F0BB-DE4B-95CE-6DB70DBA9567}" type="datetimeFigureOut">
               <a:rPr lang="en-US" smtClean="0"/>
               <a:pPr/>
-              <a:t>9/5/2017</a:t>
+              <a:t>9/26/17</a:t>
             </a:fld>
             <a:endParaRPr lang="en-US" dirty="0"/>
           </a:p>
@@ -2105,7 +2105,7 @@
             <a:fld id="{B61BEF0D-F0BB-DE4B-95CE-6DB70DBA9567}" type="datetimeFigureOut">
               <a:rPr lang="en-US" smtClean="0"/>
               <a:pPr/>
-              <a:t>9/5/2017</a:t>
+              <a:t>9/26/17</a:t>
             </a:fld>
             <a:endParaRPr lang="en-US" dirty="0"/>
           </a:p>
@@ -2278,7 +2278,7 @@
             <a:fld id="{B61BEF0D-F0BB-DE4B-95CE-6DB70DBA9567}" type="datetimeFigureOut">
               <a:rPr lang="en-US" smtClean="0"/>
               <a:pPr/>
-              <a:t>9/5/2017</a:t>
+              <a:t>9/26/17</a:t>
             </a:fld>
             <a:endParaRPr lang="en-US" dirty="0"/>
           </a:p>
@@ -2634,7 +2634,7 @@
             <a:fld id="{B61BEF0D-F0BB-DE4B-95CE-6DB70DBA9567}" type="datetimeFigureOut">
               <a:rPr lang="en-US" smtClean="0"/>
               <a:pPr/>
-              <a:t>9/5/2017</a:t>
+              <a:t>9/26/17</a:t>
             </a:fld>
             <a:endParaRPr lang="en-US" dirty="0"/>
           </a:p>
@@ -3018,7 +3018,7 @@
             <a:fld id="{B61BEF0D-F0BB-DE4B-95CE-6DB70DBA9567}" type="datetimeFigureOut">
               <a:rPr lang="en-US" smtClean="0"/>
               <a:pPr/>
-              <a:t>9/5/2017</a:t>
+              <a:t>9/26/17</a:t>
             </a:fld>
             <a:endParaRPr lang="en-US" dirty="0"/>
           </a:p>
@@ -3310,7 +3310,7 @@
             <a:fld id="{B61BEF0D-F0BB-DE4B-95CE-6DB70DBA9567}" type="datetimeFigureOut">
               <a:rPr lang="en-US" smtClean="0"/>
               <a:pPr/>
-              <a:t>9/5/2017</a:t>
+              <a:t>9/26/17</a:t>
             </a:fld>
             <a:endParaRPr lang="en-US" dirty="0"/>
           </a:p>
@@ -3896,6 +3896,13 @@
   <p:clrMapOvr>
     <a:masterClrMapping/>
   </p:clrMapOvr>
+  <p:timing>
+    <p:tnLst>
+      <p:par>
+        <p:cTn id="1" dur="indefinite" restart="never" nodeType="tmRoot"/>
+      </p:par>
+    </p:tnLst>
+  </p:timing>
 </p:sld>
 </file>
 
@@ -3997,6 +4004,88 @@
   <p:clrMapOvr>
     <a:masterClrMapping/>
   </p:clrMapOvr>
+  <p:timing>
+    <p:tnLst>
+      <p:par>
+        <p:cTn id="1" dur="indefinite" restart="never" nodeType="tmRoot">
+          <p:childTnLst>
+            <p:seq concurrent="1" nextAc="seek">
+              <p:cTn id="2" dur="indefinite" nodeType="mainSeq">
+                <p:childTnLst>
+                  <p:par>
+                    <p:cTn id="3" fill="hold">
+                      <p:stCondLst>
+                        <p:cond delay="indefinite"/>
+                      </p:stCondLst>
+                      <p:childTnLst>
+                        <p:par>
+                          <p:cTn id="4" fill="hold">
+                            <p:stCondLst>
+                              <p:cond delay="0"/>
+                            </p:stCondLst>
+                            <p:childTnLst>
+                              <p:par>
+                                <p:cTn id="5" presetID="1" presetClass="entr" presetSubtype="0" fill="hold" grpId="0" nodeType="clickEffect">
+                                  <p:stCondLst>
+                                    <p:cond delay="0"/>
+                                  </p:stCondLst>
+                                  <p:childTnLst>
+                                    <p:set>
+                                      <p:cBhvr>
+                                        <p:cTn id="6" dur="1" fill="hold">
+                                          <p:stCondLst>
+                                            <p:cond delay="0"/>
+                                          </p:stCondLst>
+                                        </p:cTn>
+                                        <p:tgtEl>
+                                          <p:spTgt spid="3">
+                                            <p:txEl>
+                                              <p:pRg st="3" end="3"/>
+                                            </p:txEl>
+                                          </p:spTgt>
+                                        </p:tgtEl>
+                                        <p:attrNameLst>
+                                          <p:attrName>style.visibility</p:attrName>
+                                        </p:attrNameLst>
+                                      </p:cBhvr>
+                                      <p:to>
+                                        <p:strVal val="visible"/>
+                                      </p:to>
+                                    </p:set>
+                                  </p:childTnLst>
+                                </p:cTn>
+                              </p:par>
+                            </p:childTnLst>
+                          </p:cTn>
+                        </p:par>
+                      </p:childTnLst>
+                    </p:cTn>
+                  </p:par>
+                </p:childTnLst>
+              </p:cTn>
+              <p:prevCondLst>
+                <p:cond evt="onPrev" delay="0">
+                  <p:tgtEl>
+                    <p:sldTgt/>
+                  </p:tgtEl>
+                </p:cond>
+              </p:prevCondLst>
+              <p:nextCondLst>
+                <p:cond evt="onNext" delay="0">
+                  <p:tgtEl>
+                    <p:sldTgt/>
+                  </p:tgtEl>
+                </p:cond>
+              </p:nextCondLst>
+            </p:seq>
+          </p:childTnLst>
+        </p:cTn>
+      </p:par>
+    </p:tnLst>
+    <p:bldLst>
+      <p:bldP spid="3" grpId="0" build="p"/>
+    </p:bldLst>
+  </p:timing>
 </p:sld>
 </file>
 
@@ -4035,7 +4124,15 @@
             <a:pPr algn="ctr"/>
             <a:r>
               <a:rPr lang="en-AU" dirty="0"/>
-              <a:t>Why are people Excited?</a:t>
+              <a:t>Why are </a:t>
+            </a:r>
+            <a:r>
+              <a:rPr lang="en-AU" dirty="0" smtClean="0"/>
+              <a:t>People </a:t>
+            </a:r>
+            <a:r>
+              <a:rPr lang="en-AU" dirty="0"/>
+              <a:t>Excited?</a:t>
             </a:r>
           </a:p>
         </p:txBody>
@@ -4073,6 +4170,81 @@
   <p:clrMapOvr>
     <a:masterClrMapping/>
   </p:clrMapOvr>
+  <p:timing>
+    <p:tnLst>
+      <p:par>
+        <p:cTn id="1" dur="indefinite" restart="never" nodeType="tmRoot">
+          <p:childTnLst>
+            <p:seq concurrent="1" nextAc="seek">
+              <p:cTn id="2" dur="indefinite" nodeType="mainSeq">
+                <p:childTnLst>
+                  <p:par>
+                    <p:cTn id="3" fill="hold">
+                      <p:stCondLst>
+                        <p:cond delay="indefinite"/>
+                      </p:stCondLst>
+                      <p:childTnLst>
+                        <p:par>
+                          <p:cTn id="4" fill="hold">
+                            <p:stCondLst>
+                              <p:cond delay="0"/>
+                            </p:stCondLst>
+                            <p:childTnLst>
+                              <p:par>
+                                <p:cTn id="5" presetID="1" presetClass="entr" presetSubtype="0" fill="hold" nodeType="clickEffect">
+                                  <p:stCondLst>
+                                    <p:cond delay="0"/>
+                                  </p:stCondLst>
+                                  <p:childTnLst>
+                                    <p:set>
+                                      <p:cBhvr>
+                                        <p:cTn id="6" dur="1" fill="hold">
+                                          <p:stCondLst>
+                                            <p:cond delay="0"/>
+                                          </p:stCondLst>
+                                        </p:cTn>
+                                        <p:tgtEl>
+                                          <p:spTgt spid="9"/>
+                                        </p:tgtEl>
+                                        <p:attrNameLst>
+                                          <p:attrName>style.visibility</p:attrName>
+                                        </p:attrNameLst>
+                                      </p:cBhvr>
+                                      <p:to>
+                                        <p:strVal val="visible"/>
+                                      </p:to>
+                                    </p:set>
+                                  </p:childTnLst>
+                                </p:cTn>
+                              </p:par>
+                            </p:childTnLst>
+                          </p:cTn>
+                        </p:par>
+                      </p:childTnLst>
+                    </p:cTn>
+                  </p:par>
+                </p:childTnLst>
+              </p:cTn>
+              <p:prevCondLst>
+                <p:cond evt="onPrev" delay="0">
+                  <p:tgtEl>
+                    <p:sldTgt/>
+                  </p:tgtEl>
+                </p:cond>
+              </p:prevCondLst>
+              <p:nextCondLst>
+                <p:cond evt="onNext" delay="0">
+                  <p:tgtEl>
+                    <p:sldTgt/>
+                  </p:tgtEl>
+                </p:cond>
+              </p:nextCondLst>
+            </p:seq>
+          </p:childTnLst>
+        </p:cTn>
+      </p:par>
+    </p:tnLst>
+  </p:timing>
 </p:sld>
 </file>
 
@@ -4168,6 +4340,13 @@
   <p:clrMapOvr>
     <a:masterClrMapping/>
   </p:clrMapOvr>
+  <p:timing>
+    <p:tnLst>
+      <p:par>
+        <p:cTn id="1" dur="indefinite" restart="never" nodeType="tmRoot"/>
+      </p:par>
+    </p:tnLst>
+  </p:timing>
 </p:sld>
 </file>
 
@@ -4244,6 +4423,13 @@
   <p:clrMapOvr>
     <a:masterClrMapping/>
   </p:clrMapOvr>
+  <p:timing>
+    <p:tnLst>
+      <p:par>
+        <p:cTn id="1" dur="indefinite" restart="never" nodeType="tmRoot"/>
+      </p:par>
+    </p:tnLst>
+  </p:timing>
 </p:sld>
 </file>
 
@@ -4286,7 +4472,7 @@
             </a:r>
             <a:r>
               <a:rPr lang="en-AU" dirty="0" err="1"/>
-              <a:t>Tensorflow</a:t>
+              <a:t>TensorFlow</a:t>
             </a:r>
             <a:endParaRPr lang="en-AU" dirty="0"/>
           </a:p>
@@ -4325,6 +4511,13 @@
   <p:clrMapOvr>
     <a:masterClrMapping/>
   </p:clrMapOvr>
+  <p:timing>
+    <p:tnLst>
+      <p:par>
+        <p:cTn id="1" dur="indefinite" restart="never" nodeType="tmRoot"/>
+      </p:par>
+    </p:tnLst>
+  </p:timing>
 </p:sld>
 </file>
 
@@ -4415,6 +4608,88 @@
   <p:clrMapOvr>
     <a:masterClrMapping/>
   </p:clrMapOvr>
+  <p:timing>
+    <p:tnLst>
+      <p:par>
+        <p:cTn id="1" dur="indefinite" restart="never" nodeType="tmRoot">
+          <p:childTnLst>
+            <p:seq concurrent="1" nextAc="seek">
+              <p:cTn id="2" dur="indefinite" nodeType="mainSeq">
+                <p:childTnLst>
+                  <p:par>
+                    <p:cTn id="3" fill="hold">
+                      <p:stCondLst>
+                        <p:cond delay="indefinite"/>
+                      </p:stCondLst>
+                      <p:childTnLst>
+                        <p:par>
+                          <p:cTn id="4" fill="hold">
+                            <p:stCondLst>
+                              <p:cond delay="0"/>
+                            </p:stCondLst>
+                            <p:childTnLst>
+                              <p:par>
+                                <p:cTn id="5" presetID="1" presetClass="entr" presetSubtype="0" fill="hold" grpId="0" nodeType="clickEffect">
+                                  <p:stCondLst>
+                                    <p:cond delay="0"/>
+                                  </p:stCondLst>
+                                  <p:childTnLst>
+                                    <p:set>
+                                      <p:cBhvr>
+                                        <p:cTn id="6" dur="1" fill="hold">
+                                          <p:stCondLst>
+                                            <p:cond delay="0"/>
+                                          </p:stCondLst>
+                                        </p:cTn>
+                                        <p:tgtEl>
+                                          <p:spTgt spid="3">
+                                            <p:txEl>
+                                              <p:pRg st="3" end="3"/>
+                                            </p:txEl>
+                                          </p:spTgt>
+                                        </p:tgtEl>
+                                        <p:attrNameLst>
+                                          <p:attrName>style.visibility</p:attrName>
+                                        </p:attrNameLst>
+                                      </p:cBhvr>
+                                      <p:to>
+                                        <p:strVal val="visible"/>
+                                      </p:to>
+                                    </p:set>
+                                  </p:childTnLst>
+                                </p:cTn>
+                              </p:par>
+                            </p:childTnLst>
+                          </p:cTn>
+                        </p:par>
+                      </p:childTnLst>
+                    </p:cTn>
+                  </p:par>
+                </p:childTnLst>
+              </p:cTn>
+              <p:prevCondLst>
+                <p:cond evt="onPrev" delay="0">
+                  <p:tgtEl>
+                    <p:sldTgt/>
+                  </p:tgtEl>
+                </p:cond>
+              </p:prevCondLst>
+              <p:nextCondLst>
+                <p:cond evt="onNext" delay="0">
+                  <p:tgtEl>
+                    <p:sldTgt/>
+                  </p:tgtEl>
+                </p:cond>
+              </p:nextCondLst>
+            </p:seq>
+          </p:childTnLst>
+        </p:cTn>
+      </p:par>
+    </p:tnLst>
+    <p:bldLst>
+      <p:bldP spid="3" grpId="0" build="p"/>
+    </p:bldLst>
+  </p:timing>
 </p:sld>
 </file>
 
@@ -4490,34 +4765,65 @@
           <a:p>
             <a:r>
               <a:rPr lang="en-AU" dirty="0"/>
-              <a:t>Deep Learning Book (</a:t>
+              <a:t>Deep Learning Book </a:t>
+            </a:r>
+            <a:r>
+              <a:rPr lang="en-AU" dirty="0" smtClean="0">
+                <a:hlinkClick r:id="rId3"/>
+              </a:rPr>
+              <a:t>http</a:t>
             </a:r>
             <a:r>
               <a:rPr lang="en-AU" dirty="0">
                 <a:hlinkClick r:id="rId3"/>
               </a:rPr>
-              <a:t>http://www.deeplearningbook.org/</a:t>
-            </a:r>
+              <a:t>://www.deeplearningbook.org</a:t>
+            </a:r>
+            <a:r>
+              <a:rPr lang="en-AU" dirty="0" smtClean="0">
+                <a:hlinkClick r:id="rId3"/>
+              </a:rPr>
+              <a:t>/</a:t>
+            </a:r>
+            <a:endParaRPr lang="en-AU" dirty="0"/>
+          </a:p>
+          <a:p>
             <a:r>
               <a:rPr lang="en-AU" dirty="0"/>
-              <a:t>) </a:t>
-            </a:r>
-          </a:p>
-          <a:p>
-            <a:r>
-              <a:rPr lang="en-AU" dirty="0"/>
-              <a:t>Andrew Ng’s new course (</a:t>
+              <a:t>Andrew Ng’s new course </a:t>
+            </a:r>
+            <a:r>
+              <a:rPr lang="en-AU" dirty="0" smtClean="0">
+                <a:hlinkClick r:id="rId4"/>
+              </a:rPr>
+              <a:t>https</a:t>
             </a:r>
             <a:r>
               <a:rPr lang="en-AU" dirty="0">
                 <a:hlinkClick r:id="rId4"/>
               </a:rPr>
-              <a:t>https://www.coursera.org/specializations/deep-learning</a:t>
-            </a:r>
+              <a:t>://</a:t>
+            </a:r>
+            <a:r>
+              <a:rPr lang="en-AU" dirty="0" smtClean="0">
+                <a:hlinkClick r:id="rId4"/>
+              </a:rPr>
+              <a:t>www.coursera.org/specializations/deep-learning</a:t>
+            </a:r>
+            <a:endParaRPr lang="en-AU" dirty="0" smtClean="0"/>
+          </a:p>
+          <a:p>
             <a:r>
               <a:rPr lang="en-AU" dirty="0"/>
-              <a:t>) </a:t>
-            </a:r>
+              <a:t>GitHub for this workshop </a:t>
+            </a:r>
+            <a:r>
+              <a:rPr lang="en-AU" dirty="0" smtClean="0">
+                <a:hlinkClick r:id="rId5"/>
+              </a:rPr>
+              <a:t>http://github.com/maitchison/tf_workshop</a:t>
+            </a:r>
+            <a:endParaRPr lang="en-AU" dirty="0"/>
           </a:p>
           <a:p>
             <a:endParaRPr lang="en-AU" dirty="0"/>
@@ -4534,6 +4840,13 @@
   <p:clrMapOvr>
     <a:masterClrMapping/>
   </p:clrMapOvr>
+  <p:timing>
+    <p:tnLst>
+      <p:par>
+        <p:cTn id="1" dur="indefinite" restart="never" nodeType="tmRoot"/>
+      </p:par>
+    </p:tnLst>
+  </p:timing>
 </p:sld>
 </file>
 

</xml_diff>

<commit_message>
Updated Notebooks to 2018 version
</commit_message>
<xml_diff>
--- a/Machine Learning.pptx
+++ b/Machine Learning.pptx
@@ -346,7 +346,7 @@
             <a:fld id="{B61BEF0D-F0BB-DE4B-95CE-6DB70DBA9567}" type="datetimeFigureOut">
               <a:rPr lang="en-US" smtClean="0"/>
               <a:pPr/>
-              <a:t>9/26/17</a:t>
+              <a:t>8/16/18</a:t>
             </a:fld>
             <a:endParaRPr lang="en-US" dirty="0"/>
           </a:p>
@@ -556,7 +556,7 @@
             <a:fld id="{B61BEF0D-F0BB-DE4B-95CE-6DB70DBA9567}" type="datetimeFigureOut">
               <a:rPr lang="en-US" smtClean="0"/>
               <a:pPr/>
-              <a:t>9/26/17</a:t>
+              <a:t>8/16/18</a:t>
             </a:fld>
             <a:endParaRPr lang="en-US" dirty="0"/>
           </a:p>
@@ -814,7 +814,7 @@
             <a:fld id="{B61BEF0D-F0BB-DE4B-95CE-6DB70DBA9567}" type="datetimeFigureOut">
               <a:rPr lang="en-US" smtClean="0"/>
               <a:pPr/>
-              <a:t>9/26/17</a:t>
+              <a:t>8/16/18</a:t>
             </a:fld>
             <a:endParaRPr lang="en-US" dirty="0"/>
           </a:p>
@@ -990,7 +990,7 @@
             <a:fld id="{B61BEF0D-F0BB-DE4B-95CE-6DB70DBA9567}" type="datetimeFigureOut">
               <a:rPr lang="en-US" smtClean="0"/>
               <a:pPr/>
-              <a:t>9/26/17</a:t>
+              <a:t>8/16/18</a:t>
             </a:fld>
             <a:endParaRPr lang="en-US" dirty="0"/>
           </a:p>
@@ -1327,7 +1327,7 @@
             <a:fld id="{B61BEF0D-F0BB-DE4B-95CE-6DB70DBA9567}" type="datetimeFigureOut">
               <a:rPr lang="en-US" smtClean="0"/>
               <a:pPr/>
-              <a:t>9/26/17</a:t>
+              <a:t>8/16/18</a:t>
             </a:fld>
             <a:endParaRPr lang="en-US" dirty="0"/>
           </a:p>
@@ -1604,7 +1604,7 @@
             <a:fld id="{B61BEF0D-F0BB-DE4B-95CE-6DB70DBA9567}" type="datetimeFigureOut">
               <a:rPr lang="en-US" smtClean="0"/>
               <a:pPr/>
-              <a:t>9/26/17</a:t>
+              <a:t>8/16/18</a:t>
             </a:fld>
             <a:endParaRPr lang="en-US" dirty="0"/>
           </a:p>
@@ -1985,7 +1985,7 @@
             <a:fld id="{B61BEF0D-F0BB-DE4B-95CE-6DB70DBA9567}" type="datetimeFigureOut">
               <a:rPr lang="en-US" smtClean="0"/>
               <a:pPr/>
-              <a:t>9/26/17</a:t>
+              <a:t>8/16/18</a:t>
             </a:fld>
             <a:endParaRPr lang="en-US" dirty="0"/>
           </a:p>
@@ -2105,7 +2105,7 @@
             <a:fld id="{B61BEF0D-F0BB-DE4B-95CE-6DB70DBA9567}" type="datetimeFigureOut">
               <a:rPr lang="en-US" smtClean="0"/>
               <a:pPr/>
-              <a:t>9/26/17</a:t>
+              <a:t>8/16/18</a:t>
             </a:fld>
             <a:endParaRPr lang="en-US" dirty="0"/>
           </a:p>
@@ -2278,7 +2278,7 @@
             <a:fld id="{B61BEF0D-F0BB-DE4B-95CE-6DB70DBA9567}" type="datetimeFigureOut">
               <a:rPr lang="en-US" smtClean="0"/>
               <a:pPr/>
-              <a:t>9/26/17</a:t>
+              <a:t>8/16/18</a:t>
             </a:fld>
             <a:endParaRPr lang="en-US" dirty="0"/>
           </a:p>
@@ -2634,7 +2634,7 @@
             <a:fld id="{B61BEF0D-F0BB-DE4B-95CE-6DB70DBA9567}" type="datetimeFigureOut">
               <a:rPr lang="en-US" smtClean="0"/>
               <a:pPr/>
-              <a:t>9/26/17</a:t>
+              <a:t>8/16/18</a:t>
             </a:fld>
             <a:endParaRPr lang="en-US" dirty="0"/>
           </a:p>
@@ -3018,7 +3018,7 @@
             <a:fld id="{B61BEF0D-F0BB-DE4B-95CE-6DB70DBA9567}" type="datetimeFigureOut">
               <a:rPr lang="en-US" smtClean="0"/>
               <a:pPr/>
-              <a:t>9/26/17</a:t>
+              <a:t>8/16/18</a:t>
             </a:fld>
             <a:endParaRPr lang="en-US" dirty="0"/>
           </a:p>
@@ -3310,7 +3310,7 @@
             <a:fld id="{B61BEF0D-F0BB-DE4B-95CE-6DB70DBA9567}" type="datetimeFigureOut">
               <a:rPr lang="en-US" smtClean="0"/>
               <a:pPr/>
-              <a:t>9/26/17</a:t>
+              <a:t>8/16/18</a:t>
             </a:fld>
             <a:endParaRPr lang="en-US" dirty="0"/>
           </a:p>
@@ -3896,13 +3896,6 @@
   <p:clrMapOvr>
     <a:masterClrMapping/>
   </p:clrMapOvr>
-  <p:timing>
-    <p:tnLst>
-      <p:par>
-        <p:cTn id="1" dur="indefinite" restart="never" nodeType="tmRoot"/>
-      </p:par>
-    </p:tnLst>
-  </p:timing>
 </p:sld>
 </file>
 
@@ -4124,15 +4117,7 @@
             <a:pPr algn="ctr"/>
             <a:r>
               <a:rPr lang="en-AU" dirty="0"/>
-              <a:t>Why are </a:t>
-            </a:r>
-            <a:r>
-              <a:rPr lang="en-AU" dirty="0" smtClean="0"/>
-              <a:t>People </a:t>
-            </a:r>
-            <a:r>
-              <a:rPr lang="en-AU" dirty="0"/>
-              <a:t>Excited?</a:t>
+              <a:t>Why are People Excited?</a:t>
             </a:r>
           </a:p>
         </p:txBody>
@@ -4340,13 +4325,6 @@
   <p:clrMapOvr>
     <a:masterClrMapping/>
   </p:clrMapOvr>
-  <p:timing>
-    <p:tnLst>
-      <p:par>
-        <p:cTn id="1" dur="indefinite" restart="never" nodeType="tmRoot"/>
-      </p:par>
-    </p:tnLst>
-  </p:timing>
 </p:sld>
 </file>
 
@@ -4423,13 +4401,6 @@
   <p:clrMapOvr>
     <a:masterClrMapping/>
   </p:clrMapOvr>
-  <p:timing>
-    <p:tnLst>
-      <p:par>
-        <p:cTn id="1" dur="indefinite" restart="never" nodeType="tmRoot"/>
-      </p:par>
-    </p:tnLst>
-  </p:timing>
 </p:sld>
 </file>
 
@@ -4511,13 +4482,6 @@
   <p:clrMapOvr>
     <a:masterClrMapping/>
   </p:clrMapOvr>
-  <p:timing>
-    <p:tnLst>
-      <p:par>
-        <p:cTn id="1" dur="indefinite" restart="never" nodeType="tmRoot"/>
-      </p:par>
-    </p:tnLst>
-  </p:timing>
 </p:sld>
 </file>
 
@@ -4768,22 +4732,10 @@
               <a:t>Deep Learning Book </a:t>
             </a:r>
             <a:r>
-              <a:rPr lang="en-AU" dirty="0" smtClean="0">
-                <a:hlinkClick r:id="rId3"/>
-              </a:rPr>
-              <a:t>http</a:t>
-            </a:r>
-            <a:r>
               <a:rPr lang="en-AU" dirty="0">
                 <a:hlinkClick r:id="rId3"/>
               </a:rPr>
-              <a:t>://www.deeplearningbook.org</a:t>
-            </a:r>
-            <a:r>
-              <a:rPr lang="en-AU" dirty="0" smtClean="0">
-                <a:hlinkClick r:id="rId3"/>
-              </a:rPr>
-              <a:t>/</a:t>
+              <a:t>http://www.deeplearningbook.org/</a:t>
             </a:r>
             <a:endParaRPr lang="en-AU" dirty="0"/>
           </a:p>
@@ -4791,26 +4743,14 @@
             <a:r>
               <a:rPr lang="en-AU" dirty="0"/>
               <a:t>Andrew Ng’s new course </a:t>
-            </a:r>
-            <a:r>
-              <a:rPr lang="en-AU" dirty="0" smtClean="0">
-                <a:hlinkClick r:id="rId4"/>
-              </a:rPr>
-              <a:t>https</a:t>
             </a:r>
             <a:r>
               <a:rPr lang="en-AU" dirty="0">
                 <a:hlinkClick r:id="rId4"/>
               </a:rPr>
-              <a:t>://</a:t>
-            </a:r>
-            <a:r>
-              <a:rPr lang="en-AU" dirty="0" smtClean="0">
-                <a:hlinkClick r:id="rId4"/>
-              </a:rPr>
-              <a:t>www.coursera.org/specializations/deep-learning</a:t>
-            </a:r>
-            <a:endParaRPr lang="en-AU" dirty="0" smtClean="0"/>
+              <a:t>https://www.coursera.org/specializations/deep-learning</a:t>
+            </a:r>
+            <a:endParaRPr lang="en-AU" dirty="0"/>
           </a:p>
           <a:p>
             <a:r>
@@ -4818,10 +4758,33 @@
               <a:t>GitHub for this workshop </a:t>
             </a:r>
             <a:r>
-              <a:rPr lang="en-AU" dirty="0" smtClean="0">
+              <a:rPr lang="en-AU" dirty="0">
                 <a:hlinkClick r:id="rId5"/>
               </a:rPr>
               <a:t>http://github.com/maitchison/tf_workshop</a:t>
+            </a:r>
+            <a:endParaRPr lang="en-AU" dirty="0"/>
+          </a:p>
+          <a:p>
+            <a:r>
+              <a:rPr lang="en-AU" dirty="0"/>
+              <a:t>Deep Visualisation Toolkit </a:t>
+            </a:r>
+            <a:r>
+              <a:rPr lang="en-AU" dirty="0">
+                <a:hlinkClick r:id="rId6"/>
+              </a:rPr>
+              <a:t>https://www.youtube.com/watch?v</a:t>
+            </a:r>
+            <a:r>
+              <a:rPr lang="en-AU">
+                <a:hlinkClick r:id="rId6"/>
+              </a:rPr>
+              <a:t>=AgkfIQ4IGaM</a:t>
+            </a:r>
+            <a:r>
+              <a:rPr lang="en-AU"/>
+              <a:t> </a:t>
             </a:r>
             <a:endParaRPr lang="en-AU" dirty="0"/>
           </a:p>
@@ -4840,13 +4803,6 @@
   <p:clrMapOvr>
     <a:masterClrMapping/>
   </p:clrMapOvr>
-  <p:timing>
-    <p:tnLst>
-      <p:par>
-        <p:cTn id="1" dur="indefinite" restart="never" nodeType="tmRoot"/>
-      </p:par>
-    </p:tnLst>
-  </p:timing>
 </p:sld>
 </file>
 

</xml_diff>